<commit_message>
Add answers to in-class exercise
</commit_message>
<xml_diff>
--- a/Lectures/lec10-application.pptx
+++ b/Lectures/lec10-application.pptx
@@ -229,7 +229,7 @@
           <a:p>
             <a:fld id="{2736D85D-8AD2-3E48-9003-FE0FC165286A}" type="datetimeFigureOut">
               <a:rPr lang="en-US" smtClean="0"/>
-              <a:t>11/13/18</a:t>
+              <a:t>12/10/18</a:t>
             </a:fld>
             <a:endParaRPr lang="en-US"/>
           </a:p>
@@ -1023,29 +1023,19 @@
       </p:grpSpPr>
       <p:sp>
         <p:nvSpPr>
-          <p:cNvPr id="75778" name="Slide Image Placeholder 1"/>
-          <p:cNvSpPr>
-            <a:spLocks noGrp="1" noRot="1" noChangeAspect="1" noTextEdit="1"/>
+          <p:cNvPr id="2" name="Slide Image Placeholder 1"/>
+          <p:cNvSpPr>
+            <a:spLocks noGrp="1" noRot="1" noChangeAspect="1"/>
           </p:cNvSpPr>
           <p:nvPr>
             <p:ph type="sldImg"/>
           </p:nvPr>
         </p:nvSpPr>
-        <p:spPr bwMode="auto">
-          <a:noFill/>
-          <a:ln>
-            <a:solidFill>
-              <a:srgbClr val="000000"/>
-            </a:solidFill>
-            <a:miter lim="800000"/>
-            <a:headEnd/>
-            <a:tailEnd/>
-          </a:ln>
-        </p:spPr>
-      </p:sp>
-      <p:sp>
-        <p:nvSpPr>
-          <p:cNvPr id="75779" name="Notes Placeholder 2"/>
+        <p:spPr/>
+      </p:sp>
+      <p:sp>
+        <p:nvSpPr>
+          <p:cNvPr id="3" name="Notes Placeholder 2"/>
           <p:cNvSpPr>
             <a:spLocks noGrp="1"/>
           </p:cNvSpPr>
@@ -1053,60 +1043,108 @@
             <p:ph type="body" idx="1"/>
           </p:nvPr>
         </p:nvSpPr>
-        <p:spPr bwMode="auto">
-          <a:noFill/>
-        </p:spPr>
-        <p:txBody>
-          <a:bodyPr wrap="square" numCol="1" anchor="t" anchorCtr="0" compatLnSpc="1">
-            <a:prstTxWarp prst="textNoShape">
-              <a:avLst/>
-            </a:prstTxWarp>
-          </a:bodyPr>
-          <a:lstStyle/>
-          <a:p>
-            <a:endParaRPr lang="en-CA"/>
-          </a:p>
-        </p:txBody>
-      </p:sp>
-      <p:sp>
-        <p:nvSpPr>
-          <p:cNvPr id="75780" name="Slide Number Placeholder 3"/>
+        <p:spPr/>
+        <p:txBody>
+          <a:bodyPr/>
+          <a:lstStyle/>
+          <a:p>
+            <a:r>
+              <a:rPr lang="en-US" dirty="0" err="1" smtClean="0"/>
+              <a:t>def</a:t>
+            </a:r>
+            <a:r>
+              <a:rPr lang="en-US" dirty="0" smtClean="0"/>
+              <a:t> search(name, conn):    </a:t>
+            </a:r>
+          </a:p>
+          <a:p>
+            <a:r>
+              <a:rPr lang="zh-CN" altLang="en-US" baseline="0" dirty="0" smtClean="0"/>
+              <a:t>    </a:t>
+            </a:r>
+            <a:r>
+              <a:rPr lang="en-US" dirty="0" err="1" smtClean="0"/>
+              <a:t>sql</a:t>
+            </a:r>
+            <a:r>
+              <a:rPr lang="en-US" dirty="0" smtClean="0"/>
+              <a:t> = "SELECT * FROM Student WHERE name = ?"    </a:t>
+            </a:r>
+          </a:p>
+          <a:p>
+            <a:r>
+              <a:rPr lang="zh-CN" altLang="en-US" baseline="0" dirty="0" smtClean="0"/>
+              <a:t>    </a:t>
+            </a:r>
+            <a:r>
+              <a:rPr lang="en-US" dirty="0" smtClean="0"/>
+              <a:t>cursor = </a:t>
+            </a:r>
+            <a:r>
+              <a:rPr lang="en-US" dirty="0" err="1" smtClean="0"/>
+              <a:t>conn.execute</a:t>
+            </a:r>
+            <a:r>
+              <a:rPr lang="en-US" dirty="0" smtClean="0"/>
+              <a:t>(</a:t>
+            </a:r>
+            <a:r>
+              <a:rPr lang="en-US" dirty="0" err="1" smtClean="0"/>
+              <a:t>sql</a:t>
+            </a:r>
+            <a:r>
+              <a:rPr lang="en-US" dirty="0" smtClean="0"/>
+              <a:t>, (name,))    </a:t>
+            </a:r>
+          </a:p>
+          <a:p>
+            <a:r>
+              <a:rPr lang="zh-CN" altLang="en-US" dirty="0" smtClean="0"/>
+              <a:t>    </a:t>
+            </a:r>
+            <a:r>
+              <a:rPr lang="en-US" dirty="0" smtClean="0"/>
+              <a:t>return </a:t>
+            </a:r>
+            <a:r>
+              <a:rPr lang="en-US" dirty="0" err="1" smtClean="0"/>
+              <a:t>cursor.fetchall</a:t>
+            </a:r>
+            <a:r>
+              <a:rPr lang="en-US" dirty="0" smtClean="0"/>
+              <a:t>()</a:t>
+            </a:r>
+            <a:endParaRPr lang="en-US" dirty="0"/>
+          </a:p>
+        </p:txBody>
+      </p:sp>
+      <p:sp>
+        <p:nvSpPr>
+          <p:cNvPr id="4" name="Slide Number Placeholder 3"/>
           <p:cNvSpPr>
             <a:spLocks noGrp="1"/>
           </p:cNvSpPr>
           <p:nvPr>
-            <p:ph type="sldNum" sz="quarter" idx="5"/>
+            <p:ph type="sldNum" sz="quarter" idx="10"/>
           </p:nvPr>
         </p:nvSpPr>
-        <p:spPr bwMode="auto">
-          <a:noFill/>
-          <a:ln>
-            <a:miter lim="800000"/>
-            <a:headEnd/>
-            <a:tailEnd/>
-          </a:ln>
-        </p:spPr>
-        <p:txBody>
-          <a:bodyPr wrap="square" numCol="1" anchorCtr="0" compatLnSpc="1">
-            <a:prstTxWarp prst="textNoShape">
-              <a:avLst/>
-            </a:prstTxWarp>
-          </a:bodyPr>
-          <a:lstStyle/>
-          <a:p>
-            <a:fld id="{55465A55-3B0D-43EF-BB1F-E32A42B003A0}" type="slidenum">
-              <a:rPr lang="en-CA" smtClean="0"/>
-              <a:pPr/>
-              <a:t>22</a:t>
+        <p:spPr/>
+        <p:txBody>
+          <a:bodyPr/>
+          <a:lstStyle/>
+          <a:p>
+            <a:fld id="{F8217A12-A6ED-4C4A-8400-036634305785}" type="slidenum">
+              <a:rPr lang="en-US" smtClean="0"/>
+              <a:t>20</a:t>
             </a:fld>
-            <a:endParaRPr lang="en-CA"/>
+            <a:endParaRPr lang="en-US"/>
           </a:p>
         </p:txBody>
       </p:sp>
     </p:spTree>
     <p:extLst>
       <p:ext uri="{BB962C8B-B14F-4D97-AF65-F5344CB8AC3E}">
-        <p14:creationId xmlns:p14="http://schemas.microsoft.com/office/powerpoint/2010/main" val="1025737425"/>
+        <p14:creationId xmlns:p14="http://schemas.microsoft.com/office/powerpoint/2010/main" val="832799872"/>
       </p:ext>
     </p:extLst>
   </p:cSld>
@@ -1135,7 +1173,7 @@
       </p:grpSpPr>
       <p:sp>
         <p:nvSpPr>
-          <p:cNvPr id="76802" name="Slide Image Placeholder 1"/>
+          <p:cNvPr id="75778" name="Slide Image Placeholder 1"/>
           <p:cNvSpPr>
             <a:spLocks noGrp="1" noRot="1" noChangeAspect="1" noTextEdit="1"/>
           </p:cNvSpPr>
@@ -1157,7 +1195,7 @@
       </p:sp>
       <p:sp>
         <p:nvSpPr>
-          <p:cNvPr id="76803" name="Notes Placeholder 2"/>
+          <p:cNvPr id="75779" name="Notes Placeholder 2"/>
           <p:cNvSpPr>
             <a:spLocks noGrp="1"/>
           </p:cNvSpPr>
@@ -1182,7 +1220,7 @@
       </p:sp>
       <p:sp>
         <p:nvSpPr>
-          <p:cNvPr id="76804" name="Slide Number Placeholder 3"/>
+          <p:cNvPr id="75780" name="Slide Number Placeholder 3"/>
           <p:cNvSpPr>
             <a:spLocks noGrp="1"/>
           </p:cNvSpPr>
@@ -1206,10 +1244,10 @@
           </a:bodyPr>
           <a:lstStyle/>
           <a:p>
-            <a:fld id="{1C03F90B-DDA0-42E7-A9BD-9A2FEFC6A113}" type="slidenum">
+            <a:fld id="{55465A55-3B0D-43EF-BB1F-E32A42B003A0}" type="slidenum">
               <a:rPr lang="en-CA" smtClean="0"/>
               <a:pPr/>
-              <a:t>23</a:t>
+              <a:t>22</a:t>
             </a:fld>
             <a:endParaRPr lang="en-CA"/>
           </a:p>
@@ -1218,7 +1256,7 @@
     </p:spTree>
     <p:extLst>
       <p:ext uri="{BB962C8B-B14F-4D97-AF65-F5344CB8AC3E}">
-        <p14:creationId xmlns:p14="http://schemas.microsoft.com/office/powerpoint/2010/main" val="215106721"/>
+        <p14:creationId xmlns:p14="http://schemas.microsoft.com/office/powerpoint/2010/main" val="1025737425"/>
       </p:ext>
     </p:extLst>
   </p:cSld>
@@ -1247,7 +1285,7 @@
       </p:grpSpPr>
       <p:sp>
         <p:nvSpPr>
-          <p:cNvPr id="77826" name="Slide Image Placeholder 1"/>
+          <p:cNvPr id="76802" name="Slide Image Placeholder 1"/>
           <p:cNvSpPr>
             <a:spLocks noGrp="1" noRot="1" noChangeAspect="1" noTextEdit="1"/>
           </p:cNvSpPr>
@@ -1269,7 +1307,7 @@
       </p:sp>
       <p:sp>
         <p:nvSpPr>
-          <p:cNvPr id="77827" name="Notes Placeholder 2"/>
+          <p:cNvPr id="76803" name="Notes Placeholder 2"/>
           <p:cNvSpPr>
             <a:spLocks noGrp="1"/>
           </p:cNvSpPr>
@@ -1294,7 +1332,7 @@
       </p:sp>
       <p:sp>
         <p:nvSpPr>
-          <p:cNvPr id="77828" name="Slide Number Placeholder 3"/>
+          <p:cNvPr id="76804" name="Slide Number Placeholder 3"/>
           <p:cNvSpPr>
             <a:spLocks noGrp="1"/>
           </p:cNvSpPr>
@@ -1318,10 +1356,10 @@
           </a:bodyPr>
           <a:lstStyle/>
           <a:p>
-            <a:fld id="{75EFC24B-AA40-4BCD-A9A7-456293E1F3B9}" type="slidenum">
+            <a:fld id="{1C03F90B-DDA0-42E7-A9BD-9A2FEFC6A113}" type="slidenum">
               <a:rPr lang="en-CA" smtClean="0"/>
               <a:pPr/>
-              <a:t>24</a:t>
+              <a:t>23</a:t>
             </a:fld>
             <a:endParaRPr lang="en-CA"/>
           </a:p>
@@ -1330,7 +1368,7 @@
     </p:spTree>
     <p:extLst>
       <p:ext uri="{BB962C8B-B14F-4D97-AF65-F5344CB8AC3E}">
-        <p14:creationId xmlns:p14="http://schemas.microsoft.com/office/powerpoint/2010/main" val="633656215"/>
+        <p14:creationId xmlns:p14="http://schemas.microsoft.com/office/powerpoint/2010/main" val="215106721"/>
       </p:ext>
     </p:extLst>
   </p:cSld>
@@ -1359,7 +1397,7 @@
       </p:grpSpPr>
       <p:sp>
         <p:nvSpPr>
-          <p:cNvPr id="79874" name="Slide Image Placeholder 1"/>
+          <p:cNvPr id="77826" name="Slide Image Placeholder 1"/>
           <p:cNvSpPr>
             <a:spLocks noGrp="1" noRot="1" noChangeAspect="1" noTextEdit="1"/>
           </p:cNvSpPr>
@@ -1381,7 +1419,7 @@
       </p:sp>
       <p:sp>
         <p:nvSpPr>
-          <p:cNvPr id="79875" name="Notes Placeholder 2"/>
+          <p:cNvPr id="77827" name="Notes Placeholder 2"/>
           <p:cNvSpPr>
             <a:spLocks noGrp="1"/>
           </p:cNvSpPr>
@@ -1406,7 +1444,7 @@
       </p:sp>
       <p:sp>
         <p:nvSpPr>
-          <p:cNvPr id="79876" name="Slide Number Placeholder 3"/>
+          <p:cNvPr id="77828" name="Slide Number Placeholder 3"/>
           <p:cNvSpPr>
             <a:spLocks noGrp="1"/>
           </p:cNvSpPr>
@@ -1430,10 +1468,10 @@
           </a:bodyPr>
           <a:lstStyle/>
           <a:p>
-            <a:fld id="{580E126F-1C61-42C2-9DAF-823061A67A6E}" type="slidenum">
+            <a:fld id="{75EFC24B-AA40-4BCD-A9A7-456293E1F3B9}" type="slidenum">
               <a:rPr lang="en-CA" smtClean="0"/>
               <a:pPr/>
-              <a:t>25</a:t>
+              <a:t>24</a:t>
             </a:fld>
             <a:endParaRPr lang="en-CA"/>
           </a:p>
@@ -1442,7 +1480,7 @@
     </p:spTree>
     <p:extLst>
       <p:ext uri="{BB962C8B-B14F-4D97-AF65-F5344CB8AC3E}">
-        <p14:creationId xmlns:p14="http://schemas.microsoft.com/office/powerpoint/2010/main" val="532871177"/>
+        <p14:creationId xmlns:p14="http://schemas.microsoft.com/office/powerpoint/2010/main" val="633656215"/>
       </p:ext>
     </p:extLst>
   </p:cSld>
@@ -1471,7 +1509,7 @@
       </p:grpSpPr>
       <p:sp>
         <p:nvSpPr>
-          <p:cNvPr id="83970" name="Slide Image Placeholder 1"/>
+          <p:cNvPr id="79874" name="Slide Image Placeholder 1"/>
           <p:cNvSpPr>
             <a:spLocks noGrp="1" noRot="1" noChangeAspect="1" noTextEdit="1"/>
           </p:cNvSpPr>
@@ -1493,7 +1531,7 @@
       </p:sp>
       <p:sp>
         <p:nvSpPr>
-          <p:cNvPr id="83971" name="Notes Placeholder 2"/>
+          <p:cNvPr id="79875" name="Notes Placeholder 2"/>
           <p:cNvSpPr>
             <a:spLocks noGrp="1"/>
           </p:cNvSpPr>
@@ -1518,7 +1556,7 @@
       </p:sp>
       <p:sp>
         <p:nvSpPr>
-          <p:cNvPr id="83972" name="Slide Number Placeholder 3"/>
+          <p:cNvPr id="79876" name="Slide Number Placeholder 3"/>
           <p:cNvSpPr>
             <a:spLocks noGrp="1"/>
           </p:cNvSpPr>
@@ -1542,10 +1580,10 @@
           </a:bodyPr>
           <a:lstStyle/>
           <a:p>
-            <a:fld id="{D3C8031F-7095-4266-AA03-9877DD5AFA7E}" type="slidenum">
+            <a:fld id="{580E126F-1C61-42C2-9DAF-823061A67A6E}" type="slidenum">
               <a:rPr lang="en-CA" smtClean="0"/>
               <a:pPr/>
-              <a:t>27</a:t>
+              <a:t>25</a:t>
             </a:fld>
             <a:endParaRPr lang="en-CA"/>
           </a:p>
@@ -1554,7 +1592,7 @@
     </p:spTree>
     <p:extLst>
       <p:ext uri="{BB962C8B-B14F-4D97-AF65-F5344CB8AC3E}">
-        <p14:creationId xmlns:p14="http://schemas.microsoft.com/office/powerpoint/2010/main" val="1351312021"/>
+        <p14:creationId xmlns:p14="http://schemas.microsoft.com/office/powerpoint/2010/main" val="532871177"/>
       </p:ext>
     </p:extLst>
   </p:cSld>
@@ -1667,6 +1705,118 @@
       </p:grpSpPr>
       <p:sp>
         <p:nvSpPr>
+          <p:cNvPr id="83970" name="Slide Image Placeholder 1"/>
+          <p:cNvSpPr>
+            <a:spLocks noGrp="1" noRot="1" noChangeAspect="1" noTextEdit="1"/>
+          </p:cNvSpPr>
+          <p:nvPr>
+            <p:ph type="sldImg"/>
+          </p:nvPr>
+        </p:nvSpPr>
+        <p:spPr bwMode="auto">
+          <a:noFill/>
+          <a:ln>
+            <a:solidFill>
+              <a:srgbClr val="000000"/>
+            </a:solidFill>
+            <a:miter lim="800000"/>
+            <a:headEnd/>
+            <a:tailEnd/>
+          </a:ln>
+        </p:spPr>
+      </p:sp>
+      <p:sp>
+        <p:nvSpPr>
+          <p:cNvPr id="83971" name="Notes Placeholder 2"/>
+          <p:cNvSpPr>
+            <a:spLocks noGrp="1"/>
+          </p:cNvSpPr>
+          <p:nvPr>
+            <p:ph type="body" idx="1"/>
+          </p:nvPr>
+        </p:nvSpPr>
+        <p:spPr bwMode="auto">
+          <a:noFill/>
+        </p:spPr>
+        <p:txBody>
+          <a:bodyPr wrap="square" numCol="1" anchor="t" anchorCtr="0" compatLnSpc="1">
+            <a:prstTxWarp prst="textNoShape">
+              <a:avLst/>
+            </a:prstTxWarp>
+          </a:bodyPr>
+          <a:lstStyle/>
+          <a:p>
+            <a:endParaRPr lang="en-CA"/>
+          </a:p>
+        </p:txBody>
+      </p:sp>
+      <p:sp>
+        <p:nvSpPr>
+          <p:cNvPr id="83972" name="Slide Number Placeholder 3"/>
+          <p:cNvSpPr>
+            <a:spLocks noGrp="1"/>
+          </p:cNvSpPr>
+          <p:nvPr>
+            <p:ph type="sldNum" sz="quarter" idx="5"/>
+          </p:nvPr>
+        </p:nvSpPr>
+        <p:spPr bwMode="auto">
+          <a:noFill/>
+          <a:ln>
+            <a:miter lim="800000"/>
+            <a:headEnd/>
+            <a:tailEnd/>
+          </a:ln>
+        </p:spPr>
+        <p:txBody>
+          <a:bodyPr wrap="square" numCol="1" anchorCtr="0" compatLnSpc="1">
+            <a:prstTxWarp prst="textNoShape">
+              <a:avLst/>
+            </a:prstTxWarp>
+          </a:bodyPr>
+          <a:lstStyle/>
+          <a:p>
+            <a:fld id="{D3C8031F-7095-4266-AA03-9877DD5AFA7E}" type="slidenum">
+              <a:rPr lang="en-CA" smtClean="0"/>
+              <a:pPr/>
+              <a:t>27</a:t>
+            </a:fld>
+            <a:endParaRPr lang="en-CA"/>
+          </a:p>
+        </p:txBody>
+      </p:sp>
+    </p:spTree>
+    <p:extLst>
+      <p:ext uri="{BB962C8B-B14F-4D97-AF65-F5344CB8AC3E}">
+        <p14:creationId xmlns:p14="http://schemas.microsoft.com/office/powerpoint/2010/main" val="1351312021"/>
+      </p:ext>
+    </p:extLst>
+  </p:cSld>
+  <p:clrMapOvr>
+    <a:masterClrMapping/>
+  </p:clrMapOvr>
+</p:notes>
+</file>
+
+<file path=ppt/notesSlides/notesSlide21.xml><?xml version="1.0" encoding="utf-8"?>
+<p:notes xmlns:a="http://schemas.openxmlformats.org/drawingml/2006/main" xmlns:r="http://schemas.openxmlformats.org/officeDocument/2006/relationships" xmlns:p="http://schemas.openxmlformats.org/presentationml/2006/main">
+  <p:cSld>
+    <p:spTree>
+      <p:nvGrpSpPr>
+        <p:cNvPr id="1" name=""/>
+        <p:cNvGrpSpPr/>
+        <p:nvPr/>
+      </p:nvGrpSpPr>
+      <p:grpSpPr>
+        <a:xfrm>
+          <a:off x="0" y="0"/>
+          <a:ext cx="0" cy="0"/>
+          <a:chOff x="0" y="0"/>
+          <a:chExt cx="0" cy="0"/>
+        </a:xfrm>
+      </p:grpSpPr>
+      <p:sp>
+        <p:nvSpPr>
           <p:cNvPr id="84994" name="Slide Image Placeholder 1"/>
           <p:cNvSpPr>
             <a:spLocks noGrp="1" noRot="1" noChangeAspect="1" noTextEdit="1"/>
@@ -1760,7 +1910,7 @@
 </p:notes>
 </file>
 
-<file path=ppt/notesSlides/notesSlide21.xml><?xml version="1.0" encoding="utf-8"?>
+<file path=ppt/notesSlides/notesSlide22.xml><?xml version="1.0" encoding="utf-8"?>
 <p:notes xmlns:a="http://schemas.openxmlformats.org/drawingml/2006/main" xmlns:r="http://schemas.openxmlformats.org/officeDocument/2006/relationships" xmlns:p="http://schemas.openxmlformats.org/presentationml/2006/main">
   <p:cSld>
     <p:spTree>
@@ -2562,7 +2712,7 @@
           <a:p>
             <a:fld id="{0D4DE428-BBF4-1143-A4EA-528F677E396D}" type="datetime1">
               <a:rPr lang="en-CA" smtClean="0"/>
-              <a:t>2018-11-13</a:t>
+              <a:t>2018-12-10</a:t>
             </a:fld>
             <a:endParaRPr lang="en-US"/>
           </a:p>
@@ -2735,7 +2885,7 @@
           <a:p>
             <a:fld id="{6C1E0F70-3CE0-E740-B1C9-DCF73F9043F3}" type="datetime1">
               <a:rPr lang="en-CA" smtClean="0"/>
-              <a:t>2018-11-13</a:t>
+              <a:t>2018-12-10</a:t>
             </a:fld>
             <a:endParaRPr lang="en-US"/>
           </a:p>
@@ -2918,7 +3068,7 @@
           <a:p>
             <a:fld id="{4C5E3B8F-5FFC-7C48-940E-DACC7C03B716}" type="datetime1">
               <a:rPr lang="en-CA" smtClean="0"/>
-              <a:t>2018-11-13</a:t>
+              <a:t>2018-12-10</a:t>
             </a:fld>
             <a:endParaRPr lang="en-US"/>
           </a:p>
@@ -3095,7 +3245,7 @@
           <a:p>
             <a:fld id="{9EC18A82-6735-E04B-8622-95F867B710E2}" type="datetime1">
               <a:rPr lang="en-CA" smtClean="0"/>
-              <a:t>2018-11-13</a:t>
+              <a:t>2018-12-10</a:t>
             </a:fld>
             <a:endParaRPr lang="en-US"/>
           </a:p>
@@ -3342,7 +3492,7 @@
           <a:p>
             <a:fld id="{A7446DEB-886E-094A-A2DA-759A3C54369E}" type="datetime1">
               <a:rPr lang="en-CA" smtClean="0"/>
-              <a:t>2018-11-13</a:t>
+              <a:t>2018-12-10</a:t>
             </a:fld>
             <a:endParaRPr lang="en-US"/>
           </a:p>
@@ -3582,7 +3732,7 @@
           <a:p>
             <a:fld id="{B2D545F9-7F80-474A-B173-990E06F99A2F}" type="datetime1">
               <a:rPr lang="en-CA" smtClean="0"/>
-              <a:t>2018-11-13</a:t>
+              <a:t>2018-12-10</a:t>
             </a:fld>
             <a:endParaRPr lang="en-US"/>
           </a:p>
@@ -3952,7 +4102,7 @@
           <a:p>
             <a:fld id="{E46B5771-0483-6F43-8804-FA069B863910}" type="datetime1">
               <a:rPr lang="en-CA" smtClean="0"/>
-              <a:t>2018-11-13</a:t>
+              <a:t>2018-12-10</a:t>
             </a:fld>
             <a:endParaRPr lang="en-US"/>
           </a:p>
@@ -4073,7 +4223,7 @@
           <a:p>
             <a:fld id="{D58F98B2-8C0B-B947-8441-C42D8CD342F4}" type="datetime1">
               <a:rPr lang="en-CA" smtClean="0"/>
-              <a:t>2018-11-13</a:t>
+              <a:t>2018-12-10</a:t>
             </a:fld>
             <a:endParaRPr lang="en-US"/>
           </a:p>
@@ -4171,7 +4321,7 @@
           <a:p>
             <a:fld id="{ED814837-9188-2749-BC24-68A8C4F19383}" type="datetime1">
               <a:rPr lang="en-CA" smtClean="0"/>
-              <a:t>2018-11-13</a:t>
+              <a:t>2018-12-10</a:t>
             </a:fld>
             <a:endParaRPr lang="en-US"/>
           </a:p>
@@ -4451,7 +4601,7 @@
           <a:p>
             <a:fld id="{92078DF9-6355-C848-85B0-D451FD567573}" type="datetime1">
               <a:rPr lang="en-CA" smtClean="0"/>
-              <a:t>2018-11-13</a:t>
+              <a:t>2018-12-10</a:t>
             </a:fld>
             <a:endParaRPr lang="en-US"/>
           </a:p>
@@ -4711,7 +4861,7 @@
           <a:p>
             <a:fld id="{2BA86EF4-3555-B74F-9D68-746998D17211}" type="datetime1">
               <a:rPr lang="en-CA" smtClean="0"/>
-              <a:t>2018-11-13</a:t>
+              <a:t>2018-12-10</a:t>
             </a:fld>
             <a:endParaRPr lang="en-US"/>
           </a:p>
@@ -4927,7 +5077,7 @@
           <a:p>
             <a:fld id="{9CDAA7C2-EA23-BD44-8D9B-221132F97325}" type="datetime1">
               <a:rPr lang="en-CA" smtClean="0"/>
-              <a:t>2018-11-13</a:t>
+              <a:t>2018-12-10</a:t>
             </a:fld>
             <a:endParaRPr lang="en-US"/>
           </a:p>
@@ -5341,7 +5491,7 @@
           <p:cNvPr id="2" name="Title 1">
             <a:extLst>
               <a:ext uri="{FF2B5EF4-FFF2-40B4-BE49-F238E27FC236}">
-                <a16:creationId xmlns:a16="http://schemas.microsoft.com/office/drawing/2014/main" id="{0E956A24-C190-3747-B8CD-1F8673245EDF}"/>
+                <a16:creationId xmlns:a16="http://schemas.microsoft.com/office/drawing/2014/main" xmlns="" id="{0E956A24-C190-3747-B8CD-1F8673245EDF}"/>
               </a:ext>
             </a:extLst>
           </p:cNvPr>
@@ -5403,7 +5553,7 @@
           <p:cNvPr id="3" name="Subtitle 2">
             <a:extLst>
               <a:ext uri="{FF2B5EF4-FFF2-40B4-BE49-F238E27FC236}">
-                <a16:creationId xmlns:a16="http://schemas.microsoft.com/office/drawing/2014/main" id="{09A3EF78-0BCF-F24C-835B-DDDA774EA0B6}"/>
+                <a16:creationId xmlns:a16="http://schemas.microsoft.com/office/drawing/2014/main" xmlns="" id="{09A3EF78-0BCF-F24C-835B-DDDA774EA0B6}"/>
               </a:ext>
             </a:extLst>
           </p:cNvPr>
@@ -5456,7 +5606,7 @@
           <p:cNvPr id="4" name="Slide Number Placeholder 3">
             <a:extLst>
               <a:ext uri="{FF2B5EF4-FFF2-40B4-BE49-F238E27FC236}">
-                <a16:creationId xmlns:a16="http://schemas.microsoft.com/office/drawing/2014/main" id="{8CF9297D-5A48-924F-A10F-D761D37F79D0}"/>
+                <a16:creationId xmlns:a16="http://schemas.microsoft.com/office/drawing/2014/main" xmlns="" id="{8CF9297D-5A48-924F-A10F-D761D37F79D0}"/>
               </a:ext>
             </a:extLst>
           </p:cNvPr>
@@ -5736,7 +5886,7 @@
           <p:cNvPr id="6" name="Slide Number Placeholder 5">
             <a:extLst>
               <a:ext uri="{FF2B5EF4-FFF2-40B4-BE49-F238E27FC236}">
-                <a16:creationId xmlns:a16="http://schemas.microsoft.com/office/drawing/2014/main" id="{213B08C2-DC5E-5E43-827A-57D6FA1E61D3}"/>
+                <a16:creationId xmlns:a16="http://schemas.microsoft.com/office/drawing/2014/main" xmlns="" id="{213B08C2-DC5E-5E43-827A-57D6FA1E61D3}"/>
               </a:ext>
             </a:extLst>
           </p:cNvPr>
@@ -5980,7 +6130,7 @@
           <p:cNvPr id="6" name="Slide Number Placeholder 5">
             <a:extLst>
               <a:ext uri="{FF2B5EF4-FFF2-40B4-BE49-F238E27FC236}">
-                <a16:creationId xmlns:a16="http://schemas.microsoft.com/office/drawing/2014/main" id="{7E871FE2-0EB5-3B4B-AE1D-1F243CCBD7DA}"/>
+                <a16:creationId xmlns:a16="http://schemas.microsoft.com/office/drawing/2014/main" xmlns="" id="{7E871FE2-0EB5-3B4B-AE1D-1F243CCBD7DA}"/>
               </a:ext>
             </a:extLst>
           </p:cNvPr>
@@ -6303,7 +6453,7 @@
           <p:cNvPr id="5" name="Slide Number Placeholder 4">
             <a:extLst>
               <a:ext uri="{FF2B5EF4-FFF2-40B4-BE49-F238E27FC236}">
-                <a16:creationId xmlns:a16="http://schemas.microsoft.com/office/drawing/2014/main" id="{0B05BC5B-136C-084D-BD6D-8B36691D3DE2}"/>
+                <a16:creationId xmlns:a16="http://schemas.microsoft.com/office/drawing/2014/main" xmlns="" id="{0B05BC5B-136C-084D-BD6D-8B36691D3DE2}"/>
               </a:ext>
             </a:extLst>
           </p:cNvPr>
@@ -6630,14 +6780,14 @@
           </a:ln>
           <a:extLst>
             <a:ext uri="{909E8E84-426E-40dd-AFC4-6F175D3DCCD1}">
-              <a14:hiddenFill xmlns="" xmlns:a14="http://schemas.microsoft.com/office/drawing/2010/main">
+              <a14:hiddenFill xmlns:a14="http://schemas.microsoft.com/office/drawing/2010/main" xmlns="">
                 <a:solidFill>
                   <a:srgbClr val="FFFFFF"/>
                 </a:solidFill>
               </a14:hiddenFill>
             </a:ext>
             <a:ext uri="{91240B29-F687-4f45-9708-019B960494DF}">
-              <a14:hiddenLine xmlns="" xmlns:a14="http://schemas.microsoft.com/office/drawing/2010/main" w="12700">
+              <a14:hiddenLine xmlns:a14="http://schemas.microsoft.com/office/drawing/2010/main" xmlns="" w="12700">
                 <a:solidFill>
                   <a:srgbClr val="000000"/>
                 </a:solidFill>
@@ -6857,14 +7007,14 @@
           </a:ln>
           <a:extLst>
             <a:ext uri="{909E8E84-426E-40dd-AFC4-6F175D3DCCD1}">
-              <a14:hiddenFill xmlns="" xmlns:a14="http://schemas.microsoft.com/office/drawing/2010/main">
+              <a14:hiddenFill xmlns:a14="http://schemas.microsoft.com/office/drawing/2010/main" xmlns="">
                 <a:solidFill>
                   <a:srgbClr val="FFFFFF"/>
                 </a:solidFill>
               </a14:hiddenFill>
             </a:ext>
             <a:ext uri="{91240B29-F687-4f45-9708-019B960494DF}">
-              <a14:hiddenLine xmlns="" xmlns:a14="http://schemas.microsoft.com/office/drawing/2010/main" w="12700">
+              <a14:hiddenLine xmlns:a14="http://schemas.microsoft.com/office/drawing/2010/main" xmlns="" w="12700">
                 <a:solidFill>
                   <a:srgbClr val="000000"/>
                 </a:solidFill>
@@ -7092,14 +7242,14 @@
           </a:ln>
           <a:extLst>
             <a:ext uri="{909E8E84-426E-40dd-AFC4-6F175D3DCCD1}">
-              <a14:hiddenFill xmlns="" xmlns:a14="http://schemas.microsoft.com/office/drawing/2010/main">
+              <a14:hiddenFill xmlns:a14="http://schemas.microsoft.com/office/drawing/2010/main" xmlns="">
                 <a:solidFill>
                   <a:srgbClr val="FFFFFF"/>
                 </a:solidFill>
               </a14:hiddenFill>
             </a:ext>
             <a:ext uri="{91240B29-F687-4f45-9708-019B960494DF}">
-              <a14:hiddenLine xmlns="" xmlns:a14="http://schemas.microsoft.com/office/drawing/2010/main" w="12700">
+              <a14:hiddenLine xmlns:a14="http://schemas.microsoft.com/office/drawing/2010/main" xmlns="" w="12700">
                 <a:solidFill>
                   <a:srgbClr val="000000"/>
                 </a:solidFill>
@@ -7326,7 +7476,7 @@
           <p:cNvPr id="8" name="Slide Number Placeholder 7">
             <a:extLst>
               <a:ext uri="{FF2B5EF4-FFF2-40B4-BE49-F238E27FC236}">
-                <a16:creationId xmlns:a16="http://schemas.microsoft.com/office/drawing/2014/main" id="{93808002-1ACA-4A40-985A-E95B578B9A6E}"/>
+                <a16:creationId xmlns:a16="http://schemas.microsoft.com/office/drawing/2014/main" xmlns="" id="{93808002-1ACA-4A40-985A-E95B578B9A6E}"/>
               </a:ext>
             </a:extLst>
           </p:cNvPr>
@@ -7568,7 +7718,7 @@
           <p:cNvPr id="5" name="Slide Number Placeholder 4">
             <a:extLst>
               <a:ext uri="{FF2B5EF4-FFF2-40B4-BE49-F238E27FC236}">
-                <a16:creationId xmlns:a16="http://schemas.microsoft.com/office/drawing/2014/main" id="{B852280E-CD69-3548-AC61-227AC158B646}"/>
+                <a16:creationId xmlns:a16="http://schemas.microsoft.com/office/drawing/2014/main" xmlns="" id="{B852280E-CD69-3548-AC61-227AC158B646}"/>
               </a:ext>
             </a:extLst>
           </p:cNvPr>
@@ -8849,7 +8999,7 @@
           <p:cNvPr id="2" name="Slide Number Placeholder 1">
             <a:extLst>
               <a:ext uri="{FF2B5EF4-FFF2-40B4-BE49-F238E27FC236}">
-                <a16:creationId xmlns:a16="http://schemas.microsoft.com/office/drawing/2014/main" id="{25A6AD67-3133-E44F-9475-1786B7584F65}"/>
+                <a16:creationId xmlns:a16="http://schemas.microsoft.com/office/drawing/2014/main" xmlns="" id="{25A6AD67-3133-E44F-9475-1786B7584F65}"/>
               </a:ext>
             </a:extLst>
           </p:cNvPr>
@@ -9839,7 +9989,7 @@
           <p:cNvPr id="2" name="Slide Number Placeholder 1">
             <a:extLst>
               <a:ext uri="{FF2B5EF4-FFF2-40B4-BE49-F238E27FC236}">
-                <a16:creationId xmlns:a16="http://schemas.microsoft.com/office/drawing/2014/main" id="{0981D1A6-5C8E-394A-9F5A-F152F7AC674B}"/>
+                <a16:creationId xmlns:a16="http://schemas.microsoft.com/office/drawing/2014/main" xmlns="" id="{0981D1A6-5C8E-394A-9F5A-F152F7AC674B}"/>
               </a:ext>
             </a:extLst>
           </p:cNvPr>
@@ -10053,7 +10203,7 @@
           <p:cNvPr id="4" name="Slide Number Placeholder 3">
             <a:extLst>
               <a:ext uri="{FF2B5EF4-FFF2-40B4-BE49-F238E27FC236}">
-                <a16:creationId xmlns:a16="http://schemas.microsoft.com/office/drawing/2014/main" id="{FCED97FA-8A68-2A42-9F98-00B750610F7F}"/>
+                <a16:creationId xmlns:a16="http://schemas.microsoft.com/office/drawing/2014/main" xmlns="" id="{FCED97FA-8A68-2A42-9F98-00B750610F7F}"/>
               </a:ext>
             </a:extLst>
           </p:cNvPr>
@@ -10335,7 +10485,7 @@
           <p:cNvPr id="4" name="Slide Number Placeholder 3">
             <a:extLst>
               <a:ext uri="{FF2B5EF4-FFF2-40B4-BE49-F238E27FC236}">
-                <a16:creationId xmlns:a16="http://schemas.microsoft.com/office/drawing/2014/main" id="{D60A17BA-CC77-FC44-87B0-7AE6007B7146}"/>
+                <a16:creationId xmlns:a16="http://schemas.microsoft.com/office/drawing/2014/main" xmlns="" id="{D60A17BA-CC77-FC44-87B0-7AE6007B7146}"/>
               </a:ext>
             </a:extLst>
           </p:cNvPr>
@@ -10453,7 +10603,7 @@
           <p:cNvPr id="7" name="Picture 6">
             <a:extLst>
               <a:ext uri="{FF2B5EF4-FFF2-40B4-BE49-F238E27FC236}">
-                <a16:creationId xmlns:a16="http://schemas.microsoft.com/office/drawing/2014/main" id="{4896BA7D-0FAA-3245-AB95-7EE777E741D2}"/>
+                <a16:creationId xmlns:a16="http://schemas.microsoft.com/office/drawing/2014/main" xmlns="" id="{4896BA7D-0FAA-3245-AB95-7EE777E741D2}"/>
               </a:ext>
             </a:extLst>
           </p:cNvPr>
@@ -10483,7 +10633,7 @@
           <p:cNvPr id="8" name="TextBox 7">
             <a:extLst>
               <a:ext uri="{FF2B5EF4-FFF2-40B4-BE49-F238E27FC236}">
-                <a16:creationId xmlns:a16="http://schemas.microsoft.com/office/drawing/2014/main" id="{9CFD7AD1-88B3-5E46-81E1-B67AAC301A69}"/>
+                <a16:creationId xmlns:a16="http://schemas.microsoft.com/office/drawing/2014/main" xmlns="" id="{9CFD7AD1-88B3-5E46-81E1-B67AAC301A69}"/>
               </a:ext>
             </a:extLst>
           </p:cNvPr>
@@ -10518,7 +10668,7 @@
           <p:cNvPr id="9" name="TextBox 8">
             <a:extLst>
               <a:ext uri="{FF2B5EF4-FFF2-40B4-BE49-F238E27FC236}">
-                <a16:creationId xmlns:a16="http://schemas.microsoft.com/office/drawing/2014/main" id="{7BAF7758-D9BE-6547-BB8C-31F5F3CECB49}"/>
+                <a16:creationId xmlns:a16="http://schemas.microsoft.com/office/drawing/2014/main" xmlns="" id="{7BAF7758-D9BE-6547-BB8C-31F5F3CECB49}"/>
               </a:ext>
             </a:extLst>
           </p:cNvPr>
@@ -10600,7 +10750,7 @@
           <p:cNvPr id="10" name="TextBox 9">
             <a:extLst>
               <a:ext uri="{FF2B5EF4-FFF2-40B4-BE49-F238E27FC236}">
-                <a16:creationId xmlns:a16="http://schemas.microsoft.com/office/drawing/2014/main" id="{57281ED1-5BF4-E841-8BB0-4C9507806D96}"/>
+                <a16:creationId xmlns:a16="http://schemas.microsoft.com/office/drawing/2014/main" xmlns="" id="{57281ED1-5BF4-E841-8BB0-4C9507806D96}"/>
               </a:ext>
             </a:extLst>
           </p:cNvPr>
@@ -10682,7 +10832,7 @@
           <p:cNvPr id="12" name="Curved Connector 11">
             <a:extLst>
               <a:ext uri="{FF2B5EF4-FFF2-40B4-BE49-F238E27FC236}">
-                <a16:creationId xmlns:a16="http://schemas.microsoft.com/office/drawing/2014/main" id="{18D20AF8-87DF-3F4F-8548-E1D630C5104C}"/>
+                <a16:creationId xmlns:a16="http://schemas.microsoft.com/office/drawing/2014/main" xmlns="" id="{18D20AF8-87DF-3F4F-8548-E1D630C5104C}"/>
               </a:ext>
             </a:extLst>
           </p:cNvPr>
@@ -10730,7 +10880,7 @@
           <p:cNvPr id="14" name="Curved Connector 13">
             <a:extLst>
               <a:ext uri="{FF2B5EF4-FFF2-40B4-BE49-F238E27FC236}">
-                <a16:creationId xmlns:a16="http://schemas.microsoft.com/office/drawing/2014/main" id="{16278738-A286-1142-AAB8-E578B8C9E9AE}"/>
+                <a16:creationId xmlns:a16="http://schemas.microsoft.com/office/drawing/2014/main" xmlns="" id="{16278738-A286-1142-AAB8-E578B8C9E9AE}"/>
               </a:ext>
             </a:extLst>
           </p:cNvPr>
@@ -11030,7 +11180,7 @@
           <p:cNvPr id="2" name="Title 1">
             <a:extLst>
               <a:ext uri="{FF2B5EF4-FFF2-40B4-BE49-F238E27FC236}">
-                <a16:creationId xmlns:a16="http://schemas.microsoft.com/office/drawing/2014/main" id="{BE6C9A7C-A761-734A-9D54-0C398F931FA2}"/>
+                <a16:creationId xmlns:a16="http://schemas.microsoft.com/office/drawing/2014/main" xmlns="" id="{BE6C9A7C-A761-734A-9D54-0C398F931FA2}"/>
               </a:ext>
             </a:extLst>
           </p:cNvPr>
@@ -11075,7 +11225,7 @@
           <p:cNvPr id="3" name="Content Placeholder 2">
             <a:extLst>
               <a:ext uri="{FF2B5EF4-FFF2-40B4-BE49-F238E27FC236}">
-                <a16:creationId xmlns:a16="http://schemas.microsoft.com/office/drawing/2014/main" id="{E63124A1-7408-3043-A7B3-771D23405C25}"/>
+                <a16:creationId xmlns:a16="http://schemas.microsoft.com/office/drawing/2014/main" xmlns="" id="{E63124A1-7408-3043-A7B3-771D23405C25}"/>
               </a:ext>
             </a:extLst>
           </p:cNvPr>
@@ -11380,7 +11530,7 @@
           <p:cNvPr id="4" name="Slide Number Placeholder 3">
             <a:extLst>
               <a:ext uri="{FF2B5EF4-FFF2-40B4-BE49-F238E27FC236}">
-                <a16:creationId xmlns:a16="http://schemas.microsoft.com/office/drawing/2014/main" id="{731ACF13-DC38-C848-BC25-BE76E35298D3}"/>
+                <a16:creationId xmlns:a16="http://schemas.microsoft.com/office/drawing/2014/main" xmlns="" id="{731ACF13-DC38-C848-BC25-BE76E35298D3}"/>
               </a:ext>
             </a:extLst>
           </p:cNvPr>
@@ -11644,7 +11794,7 @@
           <p:nvPr/>
         </p:nvPicPr>
         <p:blipFill rotWithShape="1">
-          <a:blip r:embed="rId2">
+          <a:blip r:embed="rId3">
             <a:extLst>
               <a:ext uri="{28A0092B-C50C-407E-A947-70E740481C1C}">
                 <a14:useLocalDpi xmlns:a14="http://schemas.microsoft.com/office/drawing/2010/main" val="0"/>
@@ -11673,7 +11823,7 @@
           <p:nvPr/>
         </p:nvPicPr>
         <p:blipFill rotWithShape="1">
-          <a:blip r:embed="rId2">
+          <a:blip r:embed="rId3">
             <a:extLst>
               <a:ext uri="{28A0092B-C50C-407E-A947-70E740481C1C}">
                 <a14:useLocalDpi xmlns:a14="http://schemas.microsoft.com/office/drawing/2010/main" val="0"/>
@@ -16302,7 +16452,7 @@
           <p:cNvPr id="2" name="Slide Number Placeholder 1">
             <a:extLst>
               <a:ext uri="{FF2B5EF4-FFF2-40B4-BE49-F238E27FC236}">
-                <a16:creationId xmlns:a16="http://schemas.microsoft.com/office/drawing/2014/main" id="{099826D2-6250-6A4F-8911-01C170832E1E}"/>
+                <a16:creationId xmlns:a16="http://schemas.microsoft.com/office/drawing/2014/main" xmlns="" id="{099826D2-6250-6A4F-8911-01C170832E1E}"/>
               </a:ext>
             </a:extLst>
           </p:cNvPr>
@@ -16971,7 +17121,7 @@
           <p:cNvPr id="2" name="Slide Number Placeholder 1">
             <a:extLst>
               <a:ext uri="{FF2B5EF4-FFF2-40B4-BE49-F238E27FC236}">
-                <a16:creationId xmlns:a16="http://schemas.microsoft.com/office/drawing/2014/main" id="{7CE68209-3FE7-AD46-BC4F-FC60ABB783A1}"/>
+                <a16:creationId xmlns:a16="http://schemas.microsoft.com/office/drawing/2014/main" xmlns="" id="{7CE68209-3FE7-AD46-BC4F-FC60ABB783A1}"/>
               </a:ext>
             </a:extLst>
           </p:cNvPr>
@@ -17520,7 +17670,7 @@
           <p:cNvPr id="10" name="Group 9">
             <a:extLst>
               <a:ext uri="{FF2B5EF4-FFF2-40B4-BE49-F238E27FC236}">
-                <a16:creationId xmlns:a16="http://schemas.microsoft.com/office/drawing/2014/main" id="{274065AA-CBE6-9643-BCC9-39807E8039CD}"/>
+                <a16:creationId xmlns:a16="http://schemas.microsoft.com/office/drawing/2014/main" xmlns="" id="{274065AA-CBE6-9643-BCC9-39807E8039CD}"/>
               </a:ext>
             </a:extLst>
           </p:cNvPr>
@@ -17540,7 +17690,7 @@
             <p:cNvPr id="7" name="Picture 6">
               <a:extLst>
                 <a:ext uri="{FF2B5EF4-FFF2-40B4-BE49-F238E27FC236}">
-                  <a16:creationId xmlns:a16="http://schemas.microsoft.com/office/drawing/2014/main" id="{C2E51EF0-4144-7840-A96F-69DAF5EC71EE}"/>
+                  <a16:creationId xmlns:a16="http://schemas.microsoft.com/office/drawing/2014/main" xmlns="" id="{C2E51EF0-4144-7840-A96F-69DAF5EC71EE}"/>
                 </a:ext>
               </a:extLst>
             </p:cNvPr>
@@ -17570,7 +17720,7 @@
             <p:cNvPr id="8" name="Rectangle 7">
               <a:extLst>
                 <a:ext uri="{FF2B5EF4-FFF2-40B4-BE49-F238E27FC236}">
-                  <a16:creationId xmlns:a16="http://schemas.microsoft.com/office/drawing/2014/main" id="{673672A2-679A-D345-A0FD-1B3587A60775}"/>
+                  <a16:creationId xmlns:a16="http://schemas.microsoft.com/office/drawing/2014/main" xmlns="" id="{673672A2-679A-D345-A0FD-1B3587A60775}"/>
                 </a:ext>
               </a:extLst>
             </p:cNvPr>
@@ -17622,7 +17772,7 @@
             <p:cNvPr id="9" name="TextBox 8">
               <a:extLst>
                 <a:ext uri="{FF2B5EF4-FFF2-40B4-BE49-F238E27FC236}">
-                  <a16:creationId xmlns:a16="http://schemas.microsoft.com/office/drawing/2014/main" id="{BC99E82B-A0FA-8240-84CA-6B430198FB22}"/>
+                  <a16:creationId xmlns:a16="http://schemas.microsoft.com/office/drawing/2014/main" xmlns="" id="{BC99E82B-A0FA-8240-84CA-6B430198FB22}"/>
                 </a:ext>
               </a:extLst>
             </p:cNvPr>
@@ -17820,7 +17970,7 @@
           <p:cNvPr id="4" name="Slide Number Placeholder 3">
             <a:extLst>
               <a:ext uri="{FF2B5EF4-FFF2-40B4-BE49-F238E27FC236}">
-                <a16:creationId xmlns:a16="http://schemas.microsoft.com/office/drawing/2014/main" id="{412F8C9B-572C-CA42-A34F-9CD9D081CFA2}"/>
+                <a16:creationId xmlns:a16="http://schemas.microsoft.com/office/drawing/2014/main" xmlns="" id="{412F8C9B-572C-CA42-A34F-9CD9D081CFA2}"/>
               </a:ext>
             </a:extLst>
           </p:cNvPr>
@@ -18456,7 +18606,7 @@
           <p:cNvPr id="4" name="Slide Number Placeholder 3">
             <a:extLst>
               <a:ext uri="{FF2B5EF4-FFF2-40B4-BE49-F238E27FC236}">
-                <a16:creationId xmlns:a16="http://schemas.microsoft.com/office/drawing/2014/main" id="{DD140D70-CF44-D54B-9AE3-D29B681A0D33}"/>
+                <a16:creationId xmlns:a16="http://schemas.microsoft.com/office/drawing/2014/main" xmlns="" id="{DD140D70-CF44-D54B-9AE3-D29B681A0D33}"/>
               </a:ext>
             </a:extLst>
           </p:cNvPr>
@@ -19632,7 +19782,7 @@
           <p:cNvPr id="4" name="Slide Number Placeholder 3">
             <a:extLst>
               <a:ext uri="{FF2B5EF4-FFF2-40B4-BE49-F238E27FC236}">
-                <a16:creationId xmlns:a16="http://schemas.microsoft.com/office/drawing/2014/main" id="{1602B1BB-4664-AB40-B1A2-62058D637C1D}"/>
+                <a16:creationId xmlns:a16="http://schemas.microsoft.com/office/drawing/2014/main" xmlns="" id="{1602B1BB-4664-AB40-B1A2-62058D637C1D}"/>
               </a:ext>
             </a:extLst>
           </p:cNvPr>
@@ -20036,7 +20186,7 @@
           <p:cNvPr id="5" name="Slide Number Placeholder 4">
             <a:extLst>
               <a:ext uri="{FF2B5EF4-FFF2-40B4-BE49-F238E27FC236}">
-                <a16:creationId xmlns:a16="http://schemas.microsoft.com/office/drawing/2014/main" id="{167CF2DB-0B33-4E44-B608-0427DB5D748C}"/>
+                <a16:creationId xmlns:a16="http://schemas.microsoft.com/office/drawing/2014/main" xmlns="" id="{167CF2DB-0B33-4E44-B608-0427DB5D748C}"/>
               </a:ext>
             </a:extLst>
           </p:cNvPr>
@@ -21067,7 +21217,7 @@
           <p:cNvPr id="22" name="Slide Number Placeholder 21">
             <a:extLst>
               <a:ext uri="{FF2B5EF4-FFF2-40B4-BE49-F238E27FC236}">
-                <a16:creationId xmlns:a16="http://schemas.microsoft.com/office/drawing/2014/main" id="{A2DFFBF7-DECF-F749-9F2F-A0188E2140BF}"/>
+                <a16:creationId xmlns:a16="http://schemas.microsoft.com/office/drawing/2014/main" xmlns="" id="{A2DFFBF7-DECF-F749-9F2F-A0188E2140BF}"/>
               </a:ext>
             </a:extLst>
           </p:cNvPr>
@@ -21634,7 +21784,7 @@
           <p:cNvPr id="4" name="Slide Number Placeholder 3">
             <a:extLst>
               <a:ext uri="{FF2B5EF4-FFF2-40B4-BE49-F238E27FC236}">
-                <a16:creationId xmlns:a16="http://schemas.microsoft.com/office/drawing/2014/main" id="{C41C278F-2B7F-EB4B-BEA3-AC88C0CCFFFD}"/>
+                <a16:creationId xmlns:a16="http://schemas.microsoft.com/office/drawing/2014/main" xmlns="" id="{C41C278F-2B7F-EB4B-BEA3-AC88C0CCFFFD}"/>
               </a:ext>
             </a:extLst>
           </p:cNvPr>
@@ -22218,7 +22368,7 @@
           <p:cNvPr id="9" name="Slide Number Placeholder 8">
             <a:extLst>
               <a:ext uri="{FF2B5EF4-FFF2-40B4-BE49-F238E27FC236}">
-                <a16:creationId xmlns:a16="http://schemas.microsoft.com/office/drawing/2014/main" id="{8ADB7405-B8A3-3F4D-B700-3B2580C92D86}"/>
+                <a16:creationId xmlns:a16="http://schemas.microsoft.com/office/drawing/2014/main" xmlns="" id="{8ADB7405-B8A3-3F4D-B700-3B2580C92D86}"/>
               </a:ext>
             </a:extLst>
           </p:cNvPr>

</xml_diff>